<commit_message>
forms and jquery text
</commit_message>
<xml_diff>
--- a/trunk/wubexamples/Lets_Wub.pptx
+++ b/trunk/wubexamples/Lets_Wub.pptx
@@ -5,7 +5,7 @@
     <p:sldMasterId id="2147483708" r:id="rId1"/>
   </p:sldMasterIdLst>
   <p:notesMasterIdLst>
-    <p:notesMasterId r:id="rId49"/>
+    <p:notesMasterId r:id="rId50"/>
   </p:notesMasterIdLst>
   <p:sldIdLst>
     <p:sldId id="256" r:id="rId2"/>
@@ -48,13 +48,14 @@
     <p:sldId id="302" r:id="rId39"/>
     <p:sldId id="277" r:id="rId40"/>
     <p:sldId id="278" r:id="rId41"/>
-    <p:sldId id="279" r:id="rId42"/>
-    <p:sldId id="280" r:id="rId43"/>
-    <p:sldId id="281" r:id="rId44"/>
-    <p:sldId id="282" r:id="rId45"/>
-    <p:sldId id="283" r:id="rId46"/>
-    <p:sldId id="284" r:id="rId47"/>
-    <p:sldId id="285" r:id="rId48"/>
+    <p:sldId id="304" r:id="rId42"/>
+    <p:sldId id="279" r:id="rId43"/>
+    <p:sldId id="280" r:id="rId44"/>
+    <p:sldId id="281" r:id="rId45"/>
+    <p:sldId id="282" r:id="rId46"/>
+    <p:sldId id="283" r:id="rId47"/>
+    <p:sldId id="284" r:id="rId48"/>
+    <p:sldId id="285" r:id="rId49"/>
   </p:sldIdLst>
   <p:sldSz cx="9144000" cy="6858000" type="screen4x3"/>
   <p:notesSz cx="6858000" cy="9144000"/>
@@ -239,7 +240,7 @@
             <a:fld id="{4DF4E2B3-4403-4393-BB8B-AE854F842FFB}" type="datetimeFigureOut">
               <a:rPr lang="en-US" smtClean="0"/>
               <a:pPr/>
-              <a:t>5/22/2009</a:t>
+              <a:t>5/24/2009</a:t>
             </a:fld>
             <a:endParaRPr lang="en-US"/>
           </a:p>
@@ -3949,6 +3950,88 @@
 </p:notes>
 </file>
 
+<file path=ppt/notesSlides/notesSlide48.xml><?xml version="1.0" encoding="utf-8"?>
+<p:notes xmlns:a="http://schemas.openxmlformats.org/drawingml/2006/main" xmlns:r="http://schemas.openxmlformats.org/officeDocument/2006/relationships" xmlns:p="http://schemas.openxmlformats.org/presentationml/2006/main">
+  <p:cSld>
+    <p:spTree>
+      <p:nvGrpSpPr>
+        <p:cNvPr id="1" name=""/>
+        <p:cNvGrpSpPr/>
+        <p:nvPr/>
+      </p:nvGrpSpPr>
+      <p:grpSpPr>
+        <a:xfrm>
+          <a:off x="0" y="0"/>
+          <a:ext cx="0" cy="0"/>
+          <a:chOff x="0" y="0"/>
+          <a:chExt cx="0" cy="0"/>
+        </a:xfrm>
+      </p:grpSpPr>
+      <p:sp>
+        <p:nvSpPr>
+          <p:cNvPr id="2" name="Slide Image Placeholder 1"/>
+          <p:cNvSpPr>
+            <a:spLocks noGrp="1" noRot="1" noChangeAspect="1"/>
+          </p:cNvSpPr>
+          <p:nvPr>
+            <p:ph type="sldImg"/>
+          </p:nvPr>
+        </p:nvSpPr>
+        <p:spPr/>
+      </p:sp>
+      <p:sp>
+        <p:nvSpPr>
+          <p:cNvPr id="3" name="Notes Placeholder 2"/>
+          <p:cNvSpPr>
+            <a:spLocks noGrp="1"/>
+          </p:cNvSpPr>
+          <p:nvPr>
+            <p:ph type="body" idx="1"/>
+          </p:nvPr>
+        </p:nvSpPr>
+        <p:spPr/>
+        <p:txBody>
+          <a:bodyPr>
+            <a:normAutofit/>
+          </a:bodyPr>
+          <a:lstStyle/>
+          <a:p>
+            <a:endParaRPr lang="en-US"/>
+          </a:p>
+        </p:txBody>
+      </p:sp>
+      <p:sp>
+        <p:nvSpPr>
+          <p:cNvPr id="4" name="Slide Number Placeholder 3"/>
+          <p:cNvSpPr>
+            <a:spLocks noGrp="1"/>
+          </p:cNvSpPr>
+          <p:nvPr>
+            <p:ph type="sldNum" sz="quarter" idx="10"/>
+          </p:nvPr>
+        </p:nvSpPr>
+        <p:spPr/>
+        <p:txBody>
+          <a:bodyPr/>
+          <a:lstStyle/>
+          <a:p>
+            <a:fld id="{4EE576B6-BA25-48A5-995A-4330F3F4AAF4}" type="slidenum">
+              <a:rPr lang="en-US" smtClean="0"/>
+              <a:pPr/>
+              <a:t>48</a:t>
+            </a:fld>
+            <a:endParaRPr lang="en-US"/>
+          </a:p>
+        </p:txBody>
+      </p:sp>
+    </p:spTree>
+  </p:cSld>
+  <p:clrMapOvr>
+    <a:masterClrMapping/>
+  </p:clrMapOvr>
+</p:notes>
+</file>
+
 <file path=ppt/notesSlides/notesSlide5.xml><?xml version="1.0" encoding="utf-8"?>
 <p:notes xmlns:a="http://schemas.openxmlformats.org/drawingml/2006/main" xmlns:r="http://schemas.openxmlformats.org/officeDocument/2006/relationships" xmlns:p="http://schemas.openxmlformats.org/presentationml/2006/main">
   <p:cSld>
@@ -4541,7 +4624,7 @@
             <a:fld id="{AD6CF7D0-54BE-4AFB-B0FC-FA5E364208B7}" type="datetimeFigureOut">
               <a:rPr lang="en-US" smtClean="0"/>
               <a:pPr/>
-              <a:t>5/22/2009</a:t>
+              <a:t>5/24/2009</a:t>
             </a:fld>
             <a:endParaRPr lang="en-US" dirty="0"/>
           </a:p>
@@ -4708,7 +4791,7 @@
             <a:fld id="{AD6CF7D0-54BE-4AFB-B0FC-FA5E364208B7}" type="datetimeFigureOut">
               <a:rPr lang="en-US" smtClean="0"/>
               <a:pPr/>
-              <a:t>5/22/2009</a:t>
+              <a:t>5/24/2009</a:t>
             </a:fld>
             <a:endParaRPr lang="en-US"/>
           </a:p>
@@ -4885,7 +4968,7 @@
             <a:fld id="{AD6CF7D0-54BE-4AFB-B0FC-FA5E364208B7}" type="datetimeFigureOut">
               <a:rPr lang="en-US" smtClean="0"/>
               <a:pPr/>
-              <a:t>5/22/2009</a:t>
+              <a:t>5/24/2009</a:t>
             </a:fld>
             <a:endParaRPr lang="en-US"/>
           </a:p>
@@ -5052,7 +5135,7 @@
             <a:fld id="{AD6CF7D0-54BE-4AFB-B0FC-FA5E364208B7}" type="datetimeFigureOut">
               <a:rPr lang="en-US" smtClean="0"/>
               <a:pPr/>
-              <a:t>5/22/2009</a:t>
+              <a:t>5/24/2009</a:t>
             </a:fld>
             <a:endParaRPr lang="en-US"/>
           </a:p>
@@ -5295,7 +5378,7 @@
             <a:fld id="{AD6CF7D0-54BE-4AFB-B0FC-FA5E364208B7}" type="datetimeFigureOut">
               <a:rPr lang="en-US" smtClean="0"/>
               <a:pPr/>
-              <a:t>5/22/2009</a:t>
+              <a:t>5/24/2009</a:t>
             </a:fld>
             <a:endParaRPr lang="en-US"/>
           </a:p>
@@ -5580,7 +5663,7 @@
             <a:fld id="{AD6CF7D0-54BE-4AFB-B0FC-FA5E364208B7}" type="datetimeFigureOut">
               <a:rPr lang="en-US" smtClean="0"/>
               <a:pPr/>
-              <a:t>5/22/2009</a:t>
+              <a:t>5/24/2009</a:t>
             </a:fld>
             <a:endParaRPr lang="en-US"/>
           </a:p>
@@ -5999,7 +6082,7 @@
             <a:fld id="{AD6CF7D0-54BE-4AFB-B0FC-FA5E364208B7}" type="datetimeFigureOut">
               <a:rPr lang="en-US" smtClean="0"/>
               <a:pPr/>
-              <a:t>5/22/2009</a:t>
+              <a:t>5/24/2009</a:t>
             </a:fld>
             <a:endParaRPr lang="en-US"/>
           </a:p>
@@ -6114,7 +6197,7 @@
             <a:fld id="{AD6CF7D0-54BE-4AFB-B0FC-FA5E364208B7}" type="datetimeFigureOut">
               <a:rPr lang="en-US" smtClean="0"/>
               <a:pPr/>
-              <a:t>5/22/2009</a:t>
+              <a:t>5/24/2009</a:t>
             </a:fld>
             <a:endParaRPr lang="en-US"/>
           </a:p>
@@ -6206,7 +6289,7 @@
             <a:fld id="{AD6CF7D0-54BE-4AFB-B0FC-FA5E364208B7}" type="datetimeFigureOut">
               <a:rPr lang="en-US" smtClean="0"/>
               <a:pPr/>
-              <a:t>5/22/2009</a:t>
+              <a:t>5/24/2009</a:t>
             </a:fld>
             <a:endParaRPr lang="en-US"/>
           </a:p>
@@ -6480,7 +6563,7 @@
             <a:fld id="{AD6CF7D0-54BE-4AFB-B0FC-FA5E364208B7}" type="datetimeFigureOut">
               <a:rPr lang="en-US" smtClean="0"/>
               <a:pPr/>
-              <a:t>5/22/2009</a:t>
+              <a:t>5/24/2009</a:t>
             </a:fld>
             <a:endParaRPr lang="en-US"/>
           </a:p>
@@ -6730,7 +6813,7 @@
             <a:fld id="{AD6CF7D0-54BE-4AFB-B0FC-FA5E364208B7}" type="datetimeFigureOut">
               <a:rPr lang="en-US" smtClean="0"/>
               <a:pPr/>
-              <a:t>5/22/2009</a:t>
+              <a:t>5/24/2009</a:t>
             </a:fld>
             <a:endParaRPr lang="en-US"/>
           </a:p>
@@ -6940,7 +7023,7 @@
             <a:fld id="{AD6CF7D0-54BE-4AFB-B0FC-FA5E364208B7}" type="datetimeFigureOut">
               <a:rPr lang="en-US" smtClean="0"/>
               <a:pPr/>
-              <a:t>5/22/2009</a:t>
+              <a:t>5/24/2009</a:t>
             </a:fld>
             <a:endParaRPr lang="en-US"/>
           </a:p>
@@ -15443,11 +15526,7 @@
           <a:p>
             <a:r>
               <a:rPr lang="en-US" dirty="0" smtClean="0"/>
-              <a:t>Example 5: </a:t>
-            </a:r>
-            <a:r>
-              <a:rPr lang="en-US" dirty="0" smtClean="0"/>
-              <a:t>Http commands</a:t>
+              <a:t>Example 5: Http commands</a:t>
             </a:r>
             <a:endParaRPr lang="en-US" dirty="0"/>
           </a:p>
@@ -15491,10 +15570,6 @@
               </a:rPr>
               <a:t>Http &lt;error-name&gt; &lt;response&gt; ?arguments?</a:t>
             </a:r>
-            <a:endParaRPr lang="en-US" sz="2400" dirty="0" smtClean="0">
-              <a:latin typeface="Courier New" pitchFamily="49" charset="0"/>
-              <a:cs typeface="Courier New" pitchFamily="49" charset="0"/>
-            </a:endParaRPr>
           </a:p>
           <a:p>
             <a:r>
@@ -15582,11 +15657,7 @@
             </a:r>
             <a:r>
               <a:rPr lang="en-US" dirty="0" smtClean="0"/>
-              <a:t> (307)</a:t>
-            </a:r>
-            <a:r>
-              <a:rPr lang="en-US" dirty="0" smtClean="0"/>
-              <a:t> </a:t>
+              <a:t> (307) </a:t>
             </a:r>
           </a:p>
           <a:p>
@@ -15611,11 +15682,7 @@
             </a:r>
             <a:r>
               <a:rPr lang="en-US" dirty="0" smtClean="0"/>
-              <a:t> (403)</a:t>
-            </a:r>
-            <a:r>
-              <a:rPr lang="en-US" dirty="0" smtClean="0"/>
-              <a:t>, </a:t>
+              <a:t> (403), </a:t>
             </a:r>
             <a:r>
               <a:rPr lang="en-US" dirty="0" err="1" smtClean="0">
@@ -15626,11 +15693,7 @@
             </a:r>
             <a:r>
               <a:rPr lang="en-US" dirty="0" smtClean="0"/>
-              <a:t> </a:t>
-            </a:r>
-            <a:r>
-              <a:rPr lang="en-US" dirty="0" smtClean="0"/>
-              <a:t>(404)</a:t>
+              <a:t> (404)</a:t>
             </a:r>
             <a:endParaRPr lang="en-US" dirty="0"/>
           </a:p>
@@ -16078,10 +16141,223 @@
           <a:bodyPr/>
           <a:lstStyle/>
           <a:p>
+            <a:r>
+              <a:rPr lang="en-US" dirty="0" smtClean="0"/>
+              <a:t>Create form with HTML generation commands</a:t>
+            </a:r>
+          </a:p>
+          <a:p>
+            <a:r>
+              <a:rPr lang="en-US" dirty="0" smtClean="0"/>
+              <a:t>Specify namespace proc or object method as form </a:t>
+            </a:r>
+            <a:r>
+              <a:rPr lang="en-US" dirty="0" smtClean="0">
+                <a:latin typeface="Courier New" pitchFamily="49" charset="0"/>
+                <a:cs typeface="Courier New" pitchFamily="49" charset="0"/>
+              </a:rPr>
+              <a:t>action</a:t>
+            </a:r>
+          </a:p>
+          <a:p>
+            <a:r>
+              <a:rPr lang="en-US" dirty="0" smtClean="0"/>
+              <a:t>Use post or get as form method</a:t>
+            </a:r>
+          </a:p>
+          <a:p>
+            <a:r>
+              <a:rPr lang="en-US" dirty="0" smtClean="0"/>
+              <a:t>As with queries, form entries are translated by </a:t>
+            </a:r>
+            <a:r>
+              <a:rPr lang="en-US" dirty="0" err="1" smtClean="0"/>
+              <a:t>Wub</a:t>
+            </a:r>
+            <a:r>
+              <a:rPr lang="en-US" dirty="0" smtClean="0"/>
+              <a:t> to proc/method arguments based on entry names</a:t>
+            </a:r>
             <a:endParaRPr lang="en-US" dirty="0"/>
           </a:p>
         </p:txBody>
       </p:sp>
+      <p:graphicFrame>
+        <p:nvGraphicFramePr>
+          <p:cNvPr id="4" name="Table 3"/>
+          <p:cNvGraphicFramePr>
+            <a:graphicFrameLocks noGrp="1"/>
+          </p:cNvGraphicFramePr>
+          <p:nvPr/>
+        </p:nvGraphicFramePr>
+        <p:xfrm>
+          <a:off x="2819400" y="5715000"/>
+          <a:ext cx="6096000" cy="741680"/>
+        </p:xfrm>
+        <a:graphic>
+          <a:graphicData uri="http://schemas.openxmlformats.org/drawingml/2006/table">
+            <a:tbl>
+              <a:tblPr firstRow="1" bandRow="1">
+                <a:tableStyleId>{5C22544A-7EE6-4342-B048-85BDC9FD1C3A}</a:tableStyleId>
+              </a:tblPr>
+              <a:tblGrid>
+                <a:gridCol w="1524000"/>
+                <a:gridCol w="1524000"/>
+                <a:gridCol w="1524000"/>
+                <a:gridCol w="1524000"/>
+              </a:tblGrid>
+              <a:tr h="370840">
+                <a:tc>
+                  <a:txBody>
+                    <a:bodyPr/>
+                    <a:lstStyle/>
+                    <a:p>
+                      <a:r>
+                        <a:rPr lang="en-US" dirty="0" smtClean="0"/>
+                        <a:t>&lt;form&gt;</a:t>
+                      </a:r>
+                      <a:endParaRPr lang="en-US" dirty="0"/>
+                    </a:p>
+                  </a:txBody>
+                  <a:tcPr/>
+                </a:tc>
+                <a:tc>
+                  <a:txBody>
+                    <a:bodyPr/>
+                    <a:lstStyle/>
+                    <a:p>
+                      <a:r>
+                        <a:rPr lang="en-US" dirty="0" smtClean="0"/>
+                        <a:t>&lt;input&gt;</a:t>
+                      </a:r>
+                      <a:endParaRPr lang="en-US" dirty="0"/>
+                    </a:p>
+                  </a:txBody>
+                  <a:tcPr/>
+                </a:tc>
+                <a:tc>
+                  <a:txBody>
+                    <a:bodyPr/>
+                    <a:lstStyle/>
+                    <a:p>
+                      <a:r>
+                        <a:rPr lang="en-US" dirty="0" smtClean="0"/>
+                        <a:t>&lt;button&gt;</a:t>
+                      </a:r>
+                      <a:endParaRPr lang="en-US" dirty="0"/>
+                    </a:p>
+                  </a:txBody>
+                  <a:tcPr/>
+                </a:tc>
+                <a:tc>
+                  <a:txBody>
+                    <a:bodyPr/>
+                    <a:lstStyle/>
+                    <a:p>
+                      <a:r>
+                        <a:rPr lang="en-US" dirty="0" smtClean="0"/>
+                        <a:t>&lt;hidden&gt;</a:t>
+                      </a:r>
+                      <a:endParaRPr lang="en-US" dirty="0"/>
+                    </a:p>
+                  </a:txBody>
+                  <a:tcPr/>
+                </a:tc>
+              </a:tr>
+              <a:tr h="370840">
+                <a:tc>
+                  <a:txBody>
+                    <a:bodyPr/>
+                    <a:lstStyle/>
+                    <a:p>
+                      <a:pPr marL="0" marR="0" indent="0" algn="l" defTabSz="914400" rtl="0" eaLnBrk="1" fontAlgn="auto" latinLnBrk="0" hangingPunct="1">
+                        <a:lnSpc>
+                          <a:spcPct val="100000"/>
+                        </a:lnSpc>
+                        <a:spcBef>
+                          <a:spcPts val="0"/>
+                        </a:spcBef>
+                        <a:spcAft>
+                          <a:spcPts val="0"/>
+                        </a:spcAft>
+                        <a:buClrTx/>
+                        <a:buSzTx/>
+                        <a:buFontTx/>
+                        <a:buNone/>
+                        <a:tabLst/>
+                        <a:defRPr/>
+                      </a:pPr>
+                      <a:r>
+                        <a:rPr lang="en-US" dirty="0" smtClean="0"/>
+                        <a:t>&lt;</a:t>
+                      </a:r>
+                      <a:r>
+                        <a:rPr lang="en-US" dirty="0" err="1" smtClean="0"/>
+                        <a:t>textarea</a:t>
+                      </a:r>
+                      <a:r>
+                        <a:rPr lang="en-US" dirty="0" smtClean="0"/>
+                        <a:t>&gt;</a:t>
+                      </a:r>
+                    </a:p>
+                  </a:txBody>
+                  <a:tcPr/>
+                </a:tc>
+                <a:tc>
+                  <a:txBody>
+                    <a:bodyPr/>
+                    <a:lstStyle/>
+                    <a:p>
+                      <a:r>
+                        <a:rPr lang="en-US" dirty="0" smtClean="0"/>
+                        <a:t>&lt;option&gt;</a:t>
+                      </a:r>
+                      <a:endParaRPr lang="en-US" dirty="0"/>
+                    </a:p>
+                  </a:txBody>
+                  <a:tcPr/>
+                </a:tc>
+                <a:tc>
+                  <a:txBody>
+                    <a:bodyPr/>
+                    <a:lstStyle/>
+                    <a:p>
+                      <a:r>
+                        <a:rPr lang="en-US" dirty="0" smtClean="0"/>
+                        <a:t>&lt;</a:t>
+                      </a:r>
+                      <a:r>
+                        <a:rPr lang="en-US" dirty="0" err="1" smtClean="0"/>
+                        <a:t>optgroup</a:t>
+                      </a:r>
+                      <a:r>
+                        <a:rPr lang="en-US" dirty="0" smtClean="0"/>
+                        <a:t>&gt;</a:t>
+                      </a:r>
+                      <a:endParaRPr lang="en-US" dirty="0"/>
+                    </a:p>
+                  </a:txBody>
+                  <a:tcPr/>
+                </a:tc>
+                <a:tc>
+                  <a:txBody>
+                    <a:bodyPr/>
+                    <a:lstStyle/>
+                    <a:p>
+                      <a:r>
+                        <a:rPr lang="en-US" dirty="0" smtClean="0"/>
+                        <a:t>&lt;select&gt;</a:t>
+                      </a:r>
+                      <a:endParaRPr lang="en-US" dirty="0"/>
+                    </a:p>
+                  </a:txBody>
+                  <a:tcPr/>
+                </a:tc>
+              </a:tr>
+            </a:tbl>
+          </a:graphicData>
+        </a:graphic>
+      </p:graphicFrame>
     </p:spTree>
   </p:cSld>
   <p:clrMapOvr>
@@ -16283,10 +16559,166 @@
         </p:nvSpPr>
         <p:spPr/>
         <p:txBody>
-          <a:bodyPr/>
-          <a:lstStyle/>
-          <a:p>
-            <a:endParaRPr lang="en-US"/>
+          <a:bodyPr>
+            <a:normAutofit/>
+          </a:bodyPr>
+          <a:lstStyle/>
+          <a:p>
+            <a:r>
+              <a:rPr lang="en-US" dirty="0" err="1" smtClean="0"/>
+              <a:t>jQuery</a:t>
+            </a:r>
+            <a:r>
+              <a:rPr lang="en-US" dirty="0" smtClean="0"/>
+              <a:t> is a JavaScript library   </a:t>
+            </a:r>
+          </a:p>
+          <a:p>
+            <a:pPr>
+              <a:buNone/>
+            </a:pPr>
+            <a:r>
+              <a:rPr lang="en-US" dirty="0" smtClean="0"/>
+              <a:t> </a:t>
+            </a:r>
+            <a:r>
+              <a:rPr lang="en-US" dirty="0" smtClean="0"/>
+              <a:t>     </a:t>
+            </a:r>
+            <a:r>
+              <a:rPr lang="en-US" dirty="0" smtClean="0">
+                <a:hlinkClick r:id="rId3"/>
+              </a:rPr>
+              <a:t>http</a:t>
+            </a:r>
+            <a:r>
+              <a:rPr lang="en-US" dirty="0" smtClean="0">
+                <a:hlinkClick r:id="rId3"/>
+              </a:rPr>
+              <a:t>://jquery.com</a:t>
+            </a:r>
+            <a:r>
+              <a:rPr lang="en-US" dirty="0" smtClean="0">
+                <a:hlinkClick r:id="rId3"/>
+              </a:rPr>
+              <a:t>/</a:t>
+            </a:r>
+            <a:endParaRPr lang="en-US" dirty="0" smtClean="0"/>
+          </a:p>
+          <a:p>
+            <a:r>
+              <a:rPr lang="en-US" dirty="0" err="1" smtClean="0"/>
+              <a:t>Wub</a:t>
+            </a:r>
+            <a:r>
+              <a:rPr lang="en-US" dirty="0" smtClean="0"/>
+              <a:t> makes it easy to use </a:t>
+            </a:r>
+            <a:r>
+              <a:rPr lang="en-US" dirty="0" err="1" smtClean="0"/>
+              <a:t>jQuery</a:t>
+            </a:r>
+            <a:r>
+              <a:rPr lang="en-US" dirty="0" smtClean="0"/>
+              <a:t> and some of its </a:t>
+            </a:r>
+            <a:r>
+              <a:rPr lang="en-US" dirty="0" err="1" smtClean="0"/>
+              <a:t>plugins</a:t>
+            </a:r>
+            <a:r>
+              <a:rPr lang="en-US" dirty="0" smtClean="0"/>
+              <a:t> but wrapping it into a File like domain.</a:t>
+            </a:r>
+          </a:p>
+          <a:p>
+            <a:r>
+              <a:rPr lang="en-US" dirty="0" smtClean="0"/>
+              <a:t>To add </a:t>
+            </a:r>
+            <a:r>
+              <a:rPr lang="en-US" dirty="0" err="1" smtClean="0"/>
+              <a:t>jQuery</a:t>
+            </a:r>
+            <a:r>
+              <a:rPr lang="en-US" dirty="0" smtClean="0"/>
+              <a:t> to you application add this statements:</a:t>
+            </a:r>
+          </a:p>
+          <a:p>
+            <a:pPr>
+              <a:buNone/>
+            </a:pPr>
+            <a:r>
+              <a:rPr lang="en-US" sz="3000" dirty="0" smtClean="0">
+                <a:latin typeface="Courier New" pitchFamily="49" charset="0"/>
+                <a:cs typeface="Courier New" pitchFamily="49" charset="0"/>
+              </a:rPr>
+              <a:t>  </a:t>
+            </a:r>
+            <a:r>
+              <a:rPr lang="en-US" sz="3000" dirty="0" smtClean="0">
+                <a:latin typeface="Courier New" pitchFamily="49" charset="0"/>
+                <a:cs typeface="Courier New" pitchFamily="49" charset="0"/>
+              </a:rPr>
+              <a:t>  set </a:t>
+            </a:r>
+            <a:r>
+              <a:rPr lang="en-US" sz="3000" dirty="0" err="1" smtClean="0">
+                <a:latin typeface="Courier New" pitchFamily="49" charset="0"/>
+                <a:cs typeface="Courier New" pitchFamily="49" charset="0"/>
+              </a:rPr>
+              <a:t>req</a:t>
+            </a:r>
+            <a:r>
+              <a:rPr lang="en-US" sz="3000" dirty="0" smtClean="0">
+                <a:latin typeface="Courier New" pitchFamily="49" charset="0"/>
+                <a:cs typeface="Courier New" pitchFamily="49" charset="0"/>
+              </a:rPr>
+              <a:t> [</a:t>
+            </a:r>
+            <a:r>
+              <a:rPr lang="en-US" sz="3000" dirty="0" err="1" smtClean="0">
+                <a:latin typeface="Courier New" pitchFamily="49" charset="0"/>
+                <a:cs typeface="Courier New" pitchFamily="49" charset="0"/>
+              </a:rPr>
+              <a:t>jQ</a:t>
+            </a:r>
+            <a:r>
+              <a:rPr lang="en-US" sz="3000" dirty="0" smtClean="0">
+                <a:latin typeface="Courier New" pitchFamily="49" charset="0"/>
+                <a:cs typeface="Courier New" pitchFamily="49" charset="0"/>
+              </a:rPr>
+              <a:t> </a:t>
+            </a:r>
+            <a:r>
+              <a:rPr lang="en-US" sz="3000" dirty="0" err="1" smtClean="0">
+                <a:latin typeface="Courier New" pitchFamily="49" charset="0"/>
+                <a:cs typeface="Courier New" pitchFamily="49" charset="0"/>
+              </a:rPr>
+              <a:t>jquery</a:t>
+            </a:r>
+            <a:r>
+              <a:rPr lang="en-US" sz="3000" dirty="0" smtClean="0">
+                <a:latin typeface="Courier New" pitchFamily="49" charset="0"/>
+                <a:cs typeface="Courier New" pitchFamily="49" charset="0"/>
+              </a:rPr>
+              <a:t> $</a:t>
+            </a:r>
+            <a:r>
+              <a:rPr lang="en-US" sz="3000" dirty="0" err="1" smtClean="0">
+                <a:latin typeface="Courier New" pitchFamily="49" charset="0"/>
+                <a:cs typeface="Courier New" pitchFamily="49" charset="0"/>
+              </a:rPr>
+              <a:t>req</a:t>
+            </a:r>
+            <a:r>
+              <a:rPr lang="en-US" sz="3000" dirty="0" smtClean="0">
+                <a:latin typeface="Courier New" pitchFamily="49" charset="0"/>
+                <a:cs typeface="Courier New" pitchFamily="49" charset="0"/>
+              </a:rPr>
+              <a:t>]</a:t>
+            </a:r>
           </a:p>
         </p:txBody>
       </p:sp>
@@ -16332,15 +16764,11 @@
           <a:p>
             <a:r>
               <a:rPr lang="en-US" dirty="0" smtClean="0"/>
-              <a:t>Example 8: </a:t>
+              <a:t>Example 7: </a:t>
             </a:r>
             <a:r>
               <a:rPr lang="en-US" dirty="0" err="1" smtClean="0"/>
-              <a:t>ini</a:t>
-            </a:r>
-            <a:r>
-              <a:rPr lang="en-US" dirty="0" smtClean="0"/>
-              <a:t> parameters</a:t>
+              <a:t>jQuery</a:t>
             </a:r>
             <a:endParaRPr lang="en-US" dirty="0"/>
           </a:p>
@@ -16361,15 +16789,719 @@
           <a:bodyPr/>
           <a:lstStyle/>
           <a:p>
-            <a:endParaRPr lang="en-US"/>
-          </a:p>
-        </p:txBody>
-      </p:sp>
+            <a:r>
+              <a:rPr lang="en-US" dirty="0" smtClean="0"/>
+              <a:t>To run a scripts when </a:t>
+            </a:r>
+            <a:r>
+              <a:rPr lang="en-US" dirty="0" err="1" smtClean="0"/>
+              <a:t>jQuery</a:t>
+            </a:r>
+            <a:r>
+              <a:rPr lang="en-US" dirty="0" smtClean="0"/>
+              <a:t> is loaded:</a:t>
+            </a:r>
+          </a:p>
+          <a:p>
+            <a:pPr>
+              <a:buNone/>
+            </a:pPr>
+            <a:r>
+              <a:rPr lang="en-US" sz="2000" dirty="0" smtClean="0">
+                <a:latin typeface="Courier New" pitchFamily="49" charset="0"/>
+                <a:cs typeface="Courier New" pitchFamily="49" charset="0"/>
+              </a:rPr>
+              <a:t> </a:t>
+            </a:r>
+            <a:r>
+              <a:rPr lang="en-US" sz="2000" dirty="0" smtClean="0">
+                <a:latin typeface="Courier New" pitchFamily="49" charset="0"/>
+                <a:cs typeface="Courier New" pitchFamily="49" charset="0"/>
+              </a:rPr>
+              <a:t> set </a:t>
+            </a:r>
+            <a:r>
+              <a:rPr lang="en-US" sz="2000" dirty="0" err="1" smtClean="0">
+                <a:latin typeface="Courier New" pitchFamily="49" charset="0"/>
+                <a:cs typeface="Courier New" pitchFamily="49" charset="0"/>
+              </a:rPr>
+              <a:t>req</a:t>
+            </a:r>
+            <a:r>
+              <a:rPr lang="en-US" sz="2000" dirty="0" smtClean="0">
+                <a:latin typeface="Courier New" pitchFamily="49" charset="0"/>
+                <a:cs typeface="Courier New" pitchFamily="49" charset="0"/>
+              </a:rPr>
+              <a:t> [</a:t>
+            </a:r>
+            <a:r>
+              <a:rPr lang="en-US" sz="2000" dirty="0" err="1" smtClean="0">
+                <a:latin typeface="Courier New" pitchFamily="49" charset="0"/>
+                <a:cs typeface="Courier New" pitchFamily="49" charset="0"/>
+              </a:rPr>
+              <a:t>jQ</a:t>
+            </a:r>
+            <a:r>
+              <a:rPr lang="en-US" sz="2000" dirty="0" smtClean="0">
+                <a:latin typeface="Courier New" pitchFamily="49" charset="0"/>
+                <a:cs typeface="Courier New" pitchFamily="49" charset="0"/>
+              </a:rPr>
+              <a:t> ready $</a:t>
+            </a:r>
+            <a:r>
+              <a:rPr lang="en-US" sz="2000" dirty="0" err="1" smtClean="0">
+                <a:latin typeface="Courier New" pitchFamily="49" charset="0"/>
+                <a:cs typeface="Courier New" pitchFamily="49" charset="0"/>
+              </a:rPr>
+              <a:t>req</a:t>
+            </a:r>
+            <a:r>
+              <a:rPr lang="en-US" sz="2000" dirty="0" smtClean="0">
+                <a:latin typeface="Courier New" pitchFamily="49" charset="0"/>
+                <a:cs typeface="Courier New" pitchFamily="49" charset="0"/>
+              </a:rPr>
+              <a:t> &lt;script&gt;]</a:t>
+            </a:r>
+          </a:p>
+          <a:p>
+            <a:r>
+              <a:rPr lang="en-US" dirty="0" smtClean="0">
+                <a:cs typeface="Courier New" pitchFamily="49" charset="0"/>
+              </a:rPr>
+              <a:t>To use </a:t>
+            </a:r>
+            <a:r>
+              <a:rPr lang="en-US" dirty="0" err="1" smtClean="0">
+                <a:cs typeface="Courier New" pitchFamily="49" charset="0"/>
+              </a:rPr>
+              <a:t>jQuery</a:t>
+            </a:r>
+            <a:r>
+              <a:rPr lang="en-US" dirty="0" smtClean="0">
+                <a:cs typeface="Courier New" pitchFamily="49" charset="0"/>
+              </a:rPr>
+              <a:t> </a:t>
+            </a:r>
+            <a:r>
+              <a:rPr lang="en-US" dirty="0" err="1" smtClean="0">
+                <a:cs typeface="Courier New" pitchFamily="49" charset="0"/>
+              </a:rPr>
+              <a:t>plugin</a:t>
+            </a:r>
+            <a:r>
+              <a:rPr lang="en-US" dirty="0" smtClean="0">
+                <a:cs typeface="Courier New" pitchFamily="49" charset="0"/>
+              </a:rPr>
+              <a:t>:</a:t>
+            </a:r>
+          </a:p>
+          <a:p>
+            <a:pPr>
+              <a:buNone/>
+            </a:pPr>
+            <a:r>
+              <a:rPr lang="en-US" sz="2000" dirty="0" smtClean="0">
+                <a:latin typeface="Courier New" pitchFamily="49" charset="0"/>
+                <a:cs typeface="Courier New" pitchFamily="49" charset="0"/>
+              </a:rPr>
+              <a:t>  set </a:t>
+            </a:r>
+            <a:r>
+              <a:rPr lang="en-US" sz="2000" dirty="0" err="1" smtClean="0">
+                <a:latin typeface="Courier New" pitchFamily="49" charset="0"/>
+                <a:cs typeface="Courier New" pitchFamily="49" charset="0"/>
+              </a:rPr>
+              <a:t>req</a:t>
+            </a:r>
+            <a:r>
+              <a:rPr lang="en-US" sz="2000" dirty="0" smtClean="0">
+                <a:latin typeface="Courier New" pitchFamily="49" charset="0"/>
+                <a:cs typeface="Courier New" pitchFamily="49" charset="0"/>
+              </a:rPr>
+              <a:t> [</a:t>
+            </a:r>
+            <a:r>
+              <a:rPr lang="en-US" sz="2000" dirty="0" err="1" smtClean="0">
+                <a:latin typeface="Courier New" pitchFamily="49" charset="0"/>
+                <a:cs typeface="Courier New" pitchFamily="49" charset="0"/>
+              </a:rPr>
+              <a:t>jQ</a:t>
+            </a:r>
+            <a:r>
+              <a:rPr lang="en-US" sz="2000" dirty="0" smtClean="0">
+                <a:latin typeface="Courier New" pitchFamily="49" charset="0"/>
+                <a:cs typeface="Courier New" pitchFamily="49" charset="0"/>
+              </a:rPr>
+              <a:t> &lt;</a:t>
+            </a:r>
+            <a:r>
+              <a:rPr lang="en-US" sz="2000" dirty="0" err="1" smtClean="0">
+                <a:latin typeface="Courier New" pitchFamily="49" charset="0"/>
+                <a:cs typeface="Courier New" pitchFamily="49" charset="0"/>
+              </a:rPr>
+              <a:t>plugin</a:t>
+            </a:r>
+            <a:r>
+              <a:rPr lang="en-US" sz="2000" dirty="0" smtClean="0">
+                <a:latin typeface="Courier New" pitchFamily="49" charset="0"/>
+                <a:cs typeface="Courier New" pitchFamily="49" charset="0"/>
+              </a:rPr>
+              <a:t>&gt; &lt;selector&gt; &lt;</a:t>
+            </a:r>
+            <a:r>
+              <a:rPr lang="en-US" sz="2000" dirty="0" err="1" smtClean="0">
+                <a:latin typeface="Courier New" pitchFamily="49" charset="0"/>
+                <a:cs typeface="Courier New" pitchFamily="49" charset="0"/>
+              </a:rPr>
+              <a:t>plugin</a:t>
+            </a:r>
+            <a:r>
+              <a:rPr lang="en-US" sz="2000" dirty="0" smtClean="0">
+                <a:latin typeface="Courier New" pitchFamily="49" charset="0"/>
+                <a:cs typeface="Courier New" pitchFamily="49" charset="0"/>
+              </a:rPr>
+              <a:t> arguments&gt;</a:t>
+            </a:r>
+          </a:p>
+          <a:p>
+            <a:r>
+              <a:rPr lang="en-US" dirty="0" smtClean="0">
+                <a:cs typeface="Courier New" pitchFamily="49" charset="0"/>
+              </a:rPr>
+              <a:t>List of wrapped </a:t>
+            </a:r>
+            <a:r>
+              <a:rPr lang="en-US" dirty="0" err="1" smtClean="0">
+                <a:cs typeface="Courier New" pitchFamily="49" charset="0"/>
+              </a:rPr>
+              <a:t>plugins</a:t>
+            </a:r>
+            <a:r>
+              <a:rPr lang="en-US" dirty="0" smtClean="0">
+                <a:cs typeface="Courier New" pitchFamily="49" charset="0"/>
+              </a:rPr>
+              <a:t> at    </a:t>
+            </a:r>
+            <a:r>
+              <a:rPr lang="en-US" dirty="0" smtClean="0">
+                <a:hlinkClick r:id="rId3"/>
+              </a:rPr>
+              <a:t>http://wiki.tcl.tk/_</a:t>
+            </a:r>
+            <a:r>
+              <a:rPr lang="en-US" dirty="0" smtClean="0">
+                <a:hlinkClick r:id="rId3"/>
+              </a:rPr>
+              <a:t>wub/docs/Domains/JQ</a:t>
+            </a:r>
+            <a:endParaRPr lang="en-US" dirty="0" smtClean="0"/>
+          </a:p>
+          <a:p>
+            <a:pPr>
+              <a:buNone/>
+            </a:pPr>
+            <a:endParaRPr lang="en-US" dirty="0">
+              <a:cs typeface="Courier New" pitchFamily="49" charset="0"/>
+            </a:endParaRPr>
+          </a:p>
+        </p:txBody>
+      </p:sp>
+      <p:graphicFrame>
+        <p:nvGraphicFramePr>
+          <p:cNvPr id="4" name="Table 3"/>
+          <p:cNvGraphicFramePr>
+            <a:graphicFrameLocks noGrp="1"/>
+          </p:cNvGraphicFramePr>
+          <p:nvPr/>
+        </p:nvGraphicFramePr>
+        <p:xfrm>
+          <a:off x="2743200" y="4663440"/>
+          <a:ext cx="6096000" cy="2194560"/>
+        </p:xfrm>
+        <a:graphic>
+          <a:graphicData uri="http://schemas.openxmlformats.org/drawingml/2006/table">
+            <a:tbl>
+              <a:tblPr firstRow="1" bandRow="1">
+                <a:tableStyleId>{5C22544A-7EE6-4342-B048-85BDC9FD1C3A}</a:tableStyleId>
+              </a:tblPr>
+              <a:tblGrid>
+                <a:gridCol w="1524000"/>
+                <a:gridCol w="1524000"/>
+                <a:gridCol w="1524000"/>
+                <a:gridCol w="1524000"/>
+              </a:tblGrid>
+              <a:tr h="230976">
+                <a:tc>
+                  <a:txBody>
+                    <a:bodyPr/>
+                    <a:lstStyle/>
+                    <a:p>
+                      <a:r>
+                        <a:rPr lang="en-US" sz="1200" dirty="0" err="1" smtClean="0"/>
+                        <a:t>jframe</a:t>
+                      </a:r>
+                      <a:endParaRPr lang="en-US" sz="1200" dirty="0"/>
+                    </a:p>
+                  </a:txBody>
+                  <a:tcPr/>
+                </a:tc>
+                <a:tc>
+                  <a:txBody>
+                    <a:bodyPr/>
+                    <a:lstStyle/>
+                    <a:p>
+                      <a:r>
+                        <a:rPr lang="en-US" sz="1200" dirty="0" err="1" smtClean="0"/>
+                        <a:t>jtemplates</a:t>
+                      </a:r>
+                      <a:endParaRPr lang="en-US" sz="1200" dirty="0"/>
+                    </a:p>
+                  </a:txBody>
+                  <a:tcPr/>
+                </a:tc>
+                <a:tc>
+                  <a:txBody>
+                    <a:bodyPr/>
+                    <a:lstStyle/>
+                    <a:p>
+                      <a:r>
+                        <a:rPr lang="en-US" sz="1200" dirty="0" smtClean="0"/>
+                        <a:t>history</a:t>
+                      </a:r>
+                      <a:endParaRPr lang="en-US" sz="1200" dirty="0"/>
+                    </a:p>
+                  </a:txBody>
+                  <a:tcPr/>
+                </a:tc>
+                <a:tc>
+                  <a:txBody>
+                    <a:bodyPr/>
+                    <a:lstStyle/>
+                    <a:p>
+                      <a:r>
+                        <a:rPr lang="en-US" sz="1200" dirty="0" err="1" smtClean="0"/>
+                        <a:t>datepicker</a:t>
+                      </a:r>
+                      <a:endParaRPr lang="en-US" sz="1200" dirty="0"/>
+                    </a:p>
+                  </a:txBody>
+                  <a:tcPr/>
+                </a:tc>
+              </a:tr>
+              <a:tr h="173832">
+                <a:tc>
+                  <a:txBody>
+                    <a:bodyPr/>
+                    <a:lstStyle/>
+                    <a:p>
+                      <a:r>
+                        <a:rPr lang="en-US" sz="1200" dirty="0" err="1" smtClean="0"/>
+                        <a:t>timeentry</a:t>
+                      </a:r>
+                      <a:endParaRPr lang="en-US" sz="1200" dirty="0"/>
+                    </a:p>
+                  </a:txBody>
+                  <a:tcPr/>
+                </a:tc>
+                <a:tc>
+                  <a:txBody>
+                    <a:bodyPr/>
+                    <a:lstStyle/>
+                    <a:p>
+                      <a:r>
+                        <a:rPr lang="en-US" sz="1200" dirty="0" smtClean="0"/>
+                        <a:t>hint</a:t>
+                      </a:r>
+                      <a:endParaRPr lang="en-US" sz="1200" dirty="0"/>
+                    </a:p>
+                  </a:txBody>
+                  <a:tcPr/>
+                </a:tc>
+                <a:tc>
+                  <a:txBody>
+                    <a:bodyPr/>
+                    <a:lstStyle/>
+                    <a:p>
+                      <a:r>
+                        <a:rPr lang="en-US" sz="1200" dirty="0" err="1" smtClean="0"/>
+                        <a:t>boxtoggle</a:t>
+                      </a:r>
+                      <a:endParaRPr lang="en-US" sz="1200" dirty="0"/>
+                    </a:p>
+                  </a:txBody>
+                  <a:tcPr/>
+                </a:tc>
+                <a:tc>
+                  <a:txBody>
+                    <a:bodyPr/>
+                    <a:lstStyle/>
+                    <a:p>
+                      <a:r>
+                        <a:rPr lang="en-US" sz="1200" dirty="0" err="1" smtClean="0"/>
+                        <a:t>tablesorter</a:t>
+                      </a:r>
+                      <a:endParaRPr lang="en-US" sz="1200" dirty="0"/>
+                    </a:p>
+                  </a:txBody>
+                  <a:tcPr/>
+                </a:tc>
+              </a:tr>
+              <a:tr h="173832">
+                <a:tc>
+                  <a:txBody>
+                    <a:bodyPr/>
+                    <a:lstStyle/>
+                    <a:p>
+                      <a:r>
+                        <a:rPr lang="en-US" sz="1200" dirty="0" err="1" smtClean="0"/>
+                        <a:t>multifile</a:t>
+                      </a:r>
+                      <a:endParaRPr lang="en-US" sz="1200" dirty="0"/>
+                    </a:p>
+                  </a:txBody>
+                  <a:tcPr/>
+                </a:tc>
+                <a:tc>
+                  <a:txBody>
+                    <a:bodyPr/>
+                    <a:lstStyle/>
+                    <a:p>
+                      <a:r>
+                        <a:rPr lang="en-US" sz="1200" dirty="0" smtClean="0"/>
+                        <a:t>containers</a:t>
+                      </a:r>
+                      <a:endParaRPr lang="en-US" sz="1200" dirty="0"/>
+                    </a:p>
+                  </a:txBody>
+                  <a:tcPr/>
+                </a:tc>
+                <a:tc>
+                  <a:txBody>
+                    <a:bodyPr/>
+                    <a:lstStyle/>
+                    <a:p>
+                      <a:r>
+                        <a:rPr lang="en-US" sz="1200" dirty="0" smtClean="0"/>
+                        <a:t>tabs</a:t>
+                      </a:r>
+                      <a:endParaRPr lang="en-US" sz="1200" dirty="0"/>
+                    </a:p>
+                  </a:txBody>
+                  <a:tcPr/>
+                </a:tc>
+                <a:tc>
+                  <a:txBody>
+                    <a:bodyPr/>
+                    <a:lstStyle/>
+                    <a:p>
+                      <a:r>
+                        <a:rPr lang="en-US" sz="1200" dirty="0" smtClean="0"/>
+                        <a:t>accordion</a:t>
+                      </a:r>
+                      <a:endParaRPr lang="en-US" sz="1200" dirty="0"/>
+                    </a:p>
+                  </a:txBody>
+                  <a:tcPr/>
+                </a:tc>
+              </a:tr>
+              <a:tr h="173832">
+                <a:tc>
+                  <a:txBody>
+                    <a:bodyPr/>
+                    <a:lstStyle/>
+                    <a:p>
+                      <a:r>
+                        <a:rPr lang="en-US" sz="1200" dirty="0" smtClean="0"/>
+                        <a:t>resizable</a:t>
+                      </a:r>
+                      <a:endParaRPr lang="en-US" sz="1200" dirty="0"/>
+                    </a:p>
+                  </a:txBody>
+                  <a:tcPr/>
+                </a:tc>
+                <a:tc>
+                  <a:txBody>
+                    <a:bodyPr/>
+                    <a:lstStyle/>
+                    <a:p>
+                      <a:r>
+                        <a:rPr lang="en-US" sz="1200" dirty="0" err="1" smtClean="0"/>
+                        <a:t>draggable</a:t>
+                      </a:r>
+                      <a:endParaRPr lang="en-US" sz="1200" dirty="0"/>
+                    </a:p>
+                  </a:txBody>
+                  <a:tcPr/>
+                </a:tc>
+                <a:tc>
+                  <a:txBody>
+                    <a:bodyPr/>
+                    <a:lstStyle/>
+                    <a:p>
+                      <a:r>
+                        <a:rPr lang="en-US" sz="1200" dirty="0" smtClean="0"/>
+                        <a:t>droppable</a:t>
+                      </a:r>
+                      <a:endParaRPr lang="en-US" sz="1200" dirty="0"/>
+                    </a:p>
+                  </a:txBody>
+                  <a:tcPr/>
+                </a:tc>
+                <a:tc>
+                  <a:txBody>
+                    <a:bodyPr/>
+                    <a:lstStyle/>
+                    <a:p>
+                      <a:r>
+                        <a:rPr lang="en-US" sz="1200" dirty="0" err="1" smtClean="0"/>
+                        <a:t>sortable</a:t>
+                      </a:r>
+                      <a:endParaRPr lang="en-US" sz="1200" dirty="0"/>
+                    </a:p>
+                  </a:txBody>
+                  <a:tcPr/>
+                </a:tc>
+              </a:tr>
+              <a:tr h="173832">
+                <a:tc>
+                  <a:txBody>
+                    <a:bodyPr/>
+                    <a:lstStyle/>
+                    <a:p>
+                      <a:r>
+                        <a:rPr lang="en-US" sz="1200" dirty="0" smtClean="0"/>
+                        <a:t>selectable</a:t>
+                      </a:r>
+                      <a:endParaRPr lang="en-US" sz="1200" dirty="0"/>
+                    </a:p>
+                  </a:txBody>
+                  <a:tcPr/>
+                </a:tc>
+                <a:tc>
+                  <a:txBody>
+                    <a:bodyPr/>
+                    <a:lstStyle/>
+                    <a:p>
+                      <a:r>
+                        <a:rPr lang="en-US" sz="1200" dirty="0" err="1" smtClean="0"/>
+                        <a:t>autogrow</a:t>
+                      </a:r>
+                      <a:endParaRPr lang="en-US" sz="1200" dirty="0"/>
+                    </a:p>
+                  </a:txBody>
+                  <a:tcPr/>
+                </a:tc>
+                <a:tc>
+                  <a:txBody>
+                    <a:bodyPr/>
+                    <a:lstStyle/>
+                    <a:p>
+                      <a:r>
+                        <a:rPr lang="en-US" sz="1200" dirty="0" err="1" smtClean="0"/>
+                        <a:t>autoscale</a:t>
+                      </a:r>
+                      <a:endParaRPr lang="en-US" sz="1200" dirty="0"/>
+                    </a:p>
+                  </a:txBody>
+                  <a:tcPr/>
+                </a:tc>
+                <a:tc>
+                  <a:txBody>
+                    <a:bodyPr/>
+                    <a:lstStyle/>
+                    <a:p>
+                      <a:r>
+                        <a:rPr lang="en-US" sz="1200" dirty="0" smtClean="0"/>
+                        <a:t>tooltip</a:t>
+                      </a:r>
+                      <a:endParaRPr lang="en-US" sz="1200" dirty="0"/>
+                    </a:p>
+                  </a:txBody>
+                  <a:tcPr/>
+                </a:tc>
+              </a:tr>
+              <a:tr h="173832">
+                <a:tc>
+                  <a:txBody>
+                    <a:bodyPr/>
+                    <a:lstStyle/>
+                    <a:p>
+                      <a:r>
+                        <a:rPr lang="en-US" sz="1200" dirty="0" err="1" smtClean="0"/>
+                        <a:t>hoverimage</a:t>
+                      </a:r>
+                      <a:endParaRPr lang="en-US" sz="1200" dirty="0"/>
+                    </a:p>
+                  </a:txBody>
+                  <a:tcPr/>
+                </a:tc>
+                <a:tc>
+                  <a:txBody>
+                    <a:bodyPr/>
+                    <a:lstStyle/>
+                    <a:p>
+                      <a:r>
+                        <a:rPr lang="en-US" sz="1200" dirty="0" smtClean="0"/>
+                        <a:t>galleria</a:t>
+                      </a:r>
+                      <a:endParaRPr lang="en-US" sz="1200" dirty="0"/>
+                    </a:p>
+                  </a:txBody>
+                  <a:tcPr/>
+                </a:tc>
+                <a:tc>
+                  <a:txBody>
+                    <a:bodyPr/>
+                    <a:lstStyle/>
+                    <a:p>
+                      <a:r>
+                        <a:rPr lang="en-US" sz="1200" dirty="0" smtClean="0"/>
+                        <a:t>gallery</a:t>
+                      </a:r>
+                      <a:endParaRPr lang="en-US" sz="1200" dirty="0"/>
+                    </a:p>
+                  </a:txBody>
+                  <a:tcPr/>
+                </a:tc>
+                <a:tc>
+                  <a:txBody>
+                    <a:bodyPr/>
+                    <a:lstStyle/>
+                    <a:p>
+                      <a:r>
+                        <a:rPr lang="en-US" sz="1200" dirty="0" smtClean="0"/>
+                        <a:t>editable</a:t>
+                      </a:r>
+                      <a:endParaRPr lang="en-US" sz="1200" dirty="0"/>
+                    </a:p>
+                  </a:txBody>
+                  <a:tcPr/>
+                </a:tc>
+              </a:tr>
+              <a:tr h="173832">
+                <a:tc>
+                  <a:txBody>
+                    <a:bodyPr/>
+                    <a:lstStyle/>
+                    <a:p>
+                      <a:r>
+                        <a:rPr lang="en-US" sz="1200" dirty="0" smtClean="0"/>
+                        <a:t>form</a:t>
+                      </a:r>
+                      <a:endParaRPr lang="en-US" sz="1200" dirty="0"/>
+                    </a:p>
+                  </a:txBody>
+                  <a:tcPr/>
+                </a:tc>
+                <a:tc>
+                  <a:txBody>
+                    <a:bodyPr/>
+                    <a:lstStyle/>
+                    <a:p>
+                      <a:r>
+                        <a:rPr lang="en-US" sz="1200" dirty="0" smtClean="0"/>
+                        <a:t>validate</a:t>
+                      </a:r>
+                      <a:endParaRPr lang="en-US" sz="1200" dirty="0"/>
+                    </a:p>
+                  </a:txBody>
+                  <a:tcPr/>
+                </a:tc>
+                <a:tc>
+                  <a:txBody>
+                    <a:bodyPr/>
+                    <a:lstStyle/>
+                    <a:p>
+                      <a:r>
+                        <a:rPr lang="en-US" sz="1200" dirty="0" err="1" smtClean="0"/>
+                        <a:t>autofill</a:t>
+                      </a:r>
+                      <a:endParaRPr lang="en-US" sz="1200" dirty="0"/>
+                    </a:p>
+                  </a:txBody>
+                  <a:tcPr/>
+                </a:tc>
+                <a:tc>
+                  <a:txBody>
+                    <a:bodyPr/>
+                    <a:lstStyle/>
+                    <a:p>
+                      <a:r>
+                        <a:rPr lang="en-US" sz="1200" dirty="0" smtClean="0"/>
+                        <a:t>confirm</a:t>
+                      </a:r>
+                      <a:endParaRPr lang="en-US" sz="1200" dirty="0"/>
+                    </a:p>
+                  </a:txBody>
+                  <a:tcPr/>
+                </a:tc>
+              </a:tr>
+              <a:tr h="173832">
+                <a:tc>
+                  <a:txBody>
+                    <a:bodyPr/>
+                    <a:lstStyle/>
+                    <a:p>
+                      <a:r>
+                        <a:rPr lang="en-US" sz="1200" dirty="0" err="1" smtClean="0"/>
+                        <a:t>ingrid</a:t>
+                      </a:r>
+                      <a:endParaRPr lang="en-US" sz="1200" dirty="0"/>
+                    </a:p>
+                  </a:txBody>
+                  <a:tcPr/>
+                </a:tc>
+                <a:tc>
+                  <a:txBody>
+                    <a:bodyPr/>
+                    <a:lstStyle/>
+                    <a:p>
+                      <a:r>
+                        <a:rPr lang="en-US" sz="1200" dirty="0" smtClean="0"/>
+                        <a:t>map</a:t>
+                      </a:r>
+                      <a:endParaRPr lang="en-US" sz="1200" dirty="0"/>
+                    </a:p>
+                  </a:txBody>
+                  <a:tcPr/>
+                </a:tc>
+                <a:tc>
+                  <a:txBody>
+                    <a:bodyPr/>
+                    <a:lstStyle/>
+                    <a:p>
+                      <a:endParaRPr lang="en-US" sz="1200" dirty="0"/>
+                    </a:p>
+                  </a:txBody>
+                  <a:tcPr/>
+                </a:tc>
+                <a:tc>
+                  <a:txBody>
+                    <a:bodyPr/>
+                    <a:lstStyle/>
+                    <a:p>
+                      <a:endParaRPr lang="en-US" sz="1200" dirty="0"/>
+                    </a:p>
+                  </a:txBody>
+                  <a:tcPr/>
+                </a:tc>
+              </a:tr>
+            </a:tbl>
+          </a:graphicData>
+        </a:graphic>
+      </p:graphicFrame>
     </p:spTree>
   </p:cSld>
   <p:clrMapOvr>
     <a:masterClrMapping/>
   </p:clrMapOvr>
+  <p:timing>
+    <p:tnLst>
+      <p:par>
+        <p:cTn id="1" dur="indefinite" restart="never" nodeType="tmRoot"/>
+      </p:par>
+    </p:tnLst>
+  </p:timing>
 </p:sld>
 </file>
 
@@ -16407,7 +17539,15 @@
           <a:p>
             <a:r>
               <a:rPr lang="en-US" dirty="0" smtClean="0"/>
-              <a:t>Example 9: Nub</a:t>
+              <a:t>Example 8: </a:t>
+            </a:r>
+            <a:r>
+              <a:rPr lang="en-US" dirty="0" err="1" smtClean="0"/>
+              <a:t>ini</a:t>
+            </a:r>
+            <a:r>
+              <a:rPr lang="en-US" dirty="0" smtClean="0"/>
+              <a:t> parameters</a:t>
             </a:r>
             <a:endParaRPr lang="en-US" dirty="0"/>
           </a:p>
@@ -16437,6 +17577,13 @@
   <p:clrMapOvr>
     <a:masterClrMapping/>
   </p:clrMapOvr>
+  <p:timing>
+    <p:tnLst>
+      <p:par>
+        <p:cTn id="1" dur="indefinite" restart="never" nodeType="tmRoot"/>
+      </p:par>
+    </p:tnLst>
+  </p:timing>
 </p:sld>
 </file>
 
@@ -16474,7 +17621,7 @@
           <a:p>
             <a:r>
               <a:rPr lang="en-US" dirty="0" smtClean="0"/>
-              <a:t>Example 10: Suspend/Resume</a:t>
+              <a:t>Example 9: Nub</a:t>
             </a:r>
             <a:endParaRPr lang="en-US" dirty="0"/>
           </a:p>
@@ -16541,7 +17688,7 @@
           <a:p>
             <a:r>
               <a:rPr lang="en-US" dirty="0" smtClean="0"/>
-              <a:t>Example 11: Cookies</a:t>
+              <a:t>Example 10: Suspend/Resume</a:t>
             </a:r>
             <a:endParaRPr lang="en-US" dirty="0"/>
           </a:p>
@@ -16608,7 +17755,7 @@
           <a:p>
             <a:r>
               <a:rPr lang="en-US" dirty="0" smtClean="0"/>
-              <a:t>Example 12: Command port</a:t>
+              <a:t>Example 11: Cookies</a:t>
             </a:r>
             <a:endParaRPr lang="en-US" dirty="0"/>
           </a:p>
@@ -16675,7 +17822,7 @@
           <a:p>
             <a:r>
               <a:rPr lang="en-US" dirty="0" smtClean="0"/>
-              <a:t>Conclusion</a:t>
+              <a:t>Example 12: Command port</a:t>
             </a:r>
             <a:endParaRPr lang="en-US" dirty="0"/>
           </a:p>
@@ -16709,6 +17856,73 @@
 </file>
 
 <file path=ppt/slides/slide47.xml><?xml version="1.0" encoding="utf-8"?>
+<p:sld xmlns:a="http://schemas.openxmlformats.org/drawingml/2006/main" xmlns:r="http://schemas.openxmlformats.org/officeDocument/2006/relationships" xmlns:p="http://schemas.openxmlformats.org/presentationml/2006/main">
+  <p:cSld>
+    <p:spTree>
+      <p:nvGrpSpPr>
+        <p:cNvPr id="1" name=""/>
+        <p:cNvGrpSpPr/>
+        <p:nvPr/>
+      </p:nvGrpSpPr>
+      <p:grpSpPr>
+        <a:xfrm>
+          <a:off x="0" y="0"/>
+          <a:ext cx="0" cy="0"/>
+          <a:chOff x="0" y="0"/>
+          <a:chExt cx="0" cy="0"/>
+        </a:xfrm>
+      </p:grpSpPr>
+      <p:sp>
+        <p:nvSpPr>
+          <p:cNvPr id="2" name="Title 1"/>
+          <p:cNvSpPr>
+            <a:spLocks noGrp="1"/>
+          </p:cNvSpPr>
+          <p:nvPr>
+            <p:ph type="title"/>
+          </p:nvPr>
+        </p:nvSpPr>
+        <p:spPr/>
+        <p:txBody>
+          <a:bodyPr/>
+          <a:lstStyle/>
+          <a:p>
+            <a:r>
+              <a:rPr lang="en-US" dirty="0" smtClean="0"/>
+              <a:t>Conclusion</a:t>
+            </a:r>
+            <a:endParaRPr lang="en-US" dirty="0"/>
+          </a:p>
+        </p:txBody>
+      </p:sp>
+      <p:sp>
+        <p:nvSpPr>
+          <p:cNvPr id="3" name="Content Placeholder 2"/>
+          <p:cNvSpPr>
+            <a:spLocks noGrp="1"/>
+          </p:cNvSpPr>
+          <p:nvPr>
+            <p:ph idx="1"/>
+          </p:nvPr>
+        </p:nvSpPr>
+        <p:spPr/>
+        <p:txBody>
+          <a:bodyPr/>
+          <a:lstStyle/>
+          <a:p>
+            <a:endParaRPr lang="en-US"/>
+          </a:p>
+        </p:txBody>
+      </p:sp>
+    </p:spTree>
+  </p:cSld>
+  <p:clrMapOvr>
+    <a:masterClrMapping/>
+  </p:clrMapOvr>
+</p:sld>
+</file>
+
+<file path=ppt/slides/slide48.xml><?xml version="1.0" encoding="utf-8"?>
 <p:sld xmlns:a="http://schemas.openxmlformats.org/drawingml/2006/main" xmlns:r="http://schemas.openxmlformats.org/officeDocument/2006/relationships" xmlns:p="http://schemas.openxmlformats.org/presentationml/2006/main">
   <p:cSld>
     <p:spTree>

</xml_diff>

<commit_message>
Adapted for Wub Shell changes
</commit_message>
<xml_diff>
--- a/trunk/wubexamples/Lets_Wub.pptx
+++ b/trunk/wubexamples/Lets_Wub.pptx
@@ -245,7 +245,7 @@
             <a:fld id="{4DF4E2B3-4403-4393-BB8B-AE854F842FFB}" type="datetimeFigureOut">
               <a:rPr lang="en-US" smtClean="0"/>
               <a:pPr/>
-              <a:t>6/6/2009</a:t>
+              <a:t>8/5/2009</a:t>
             </a:fld>
             <a:endParaRPr lang="en-US"/>
           </a:p>
@@ -5039,7 +5039,7 @@
             <a:fld id="{AD6CF7D0-54BE-4AFB-B0FC-FA5E364208B7}" type="datetimeFigureOut">
               <a:rPr lang="en-US" smtClean="0"/>
               <a:pPr/>
-              <a:t>6/6/2009</a:t>
+              <a:t>8/5/2009</a:t>
             </a:fld>
             <a:endParaRPr lang="en-US" dirty="0"/>
           </a:p>
@@ -5206,7 +5206,7 @@
             <a:fld id="{AD6CF7D0-54BE-4AFB-B0FC-FA5E364208B7}" type="datetimeFigureOut">
               <a:rPr lang="en-US" smtClean="0"/>
               <a:pPr/>
-              <a:t>6/6/2009</a:t>
+              <a:t>8/5/2009</a:t>
             </a:fld>
             <a:endParaRPr lang="en-US"/>
           </a:p>
@@ -5383,7 +5383,7 @@
             <a:fld id="{AD6CF7D0-54BE-4AFB-B0FC-FA5E364208B7}" type="datetimeFigureOut">
               <a:rPr lang="en-US" smtClean="0"/>
               <a:pPr/>
-              <a:t>6/6/2009</a:t>
+              <a:t>8/5/2009</a:t>
             </a:fld>
             <a:endParaRPr lang="en-US"/>
           </a:p>
@@ -5550,7 +5550,7 @@
             <a:fld id="{AD6CF7D0-54BE-4AFB-B0FC-FA5E364208B7}" type="datetimeFigureOut">
               <a:rPr lang="en-US" smtClean="0"/>
               <a:pPr/>
-              <a:t>6/6/2009</a:t>
+              <a:t>8/5/2009</a:t>
             </a:fld>
             <a:endParaRPr lang="en-US"/>
           </a:p>
@@ -5793,7 +5793,7 @@
             <a:fld id="{AD6CF7D0-54BE-4AFB-B0FC-FA5E364208B7}" type="datetimeFigureOut">
               <a:rPr lang="en-US" smtClean="0"/>
               <a:pPr/>
-              <a:t>6/6/2009</a:t>
+              <a:t>8/5/2009</a:t>
             </a:fld>
             <a:endParaRPr lang="en-US"/>
           </a:p>
@@ -6078,7 +6078,7 @@
             <a:fld id="{AD6CF7D0-54BE-4AFB-B0FC-FA5E364208B7}" type="datetimeFigureOut">
               <a:rPr lang="en-US" smtClean="0"/>
               <a:pPr/>
-              <a:t>6/6/2009</a:t>
+              <a:t>8/5/2009</a:t>
             </a:fld>
             <a:endParaRPr lang="en-US"/>
           </a:p>
@@ -6497,7 +6497,7 @@
             <a:fld id="{AD6CF7D0-54BE-4AFB-B0FC-FA5E364208B7}" type="datetimeFigureOut">
               <a:rPr lang="en-US" smtClean="0"/>
               <a:pPr/>
-              <a:t>6/6/2009</a:t>
+              <a:t>8/5/2009</a:t>
             </a:fld>
             <a:endParaRPr lang="en-US"/>
           </a:p>
@@ -6612,7 +6612,7 @@
             <a:fld id="{AD6CF7D0-54BE-4AFB-B0FC-FA5E364208B7}" type="datetimeFigureOut">
               <a:rPr lang="en-US" smtClean="0"/>
               <a:pPr/>
-              <a:t>6/6/2009</a:t>
+              <a:t>8/5/2009</a:t>
             </a:fld>
             <a:endParaRPr lang="en-US"/>
           </a:p>
@@ -6704,7 +6704,7 @@
             <a:fld id="{AD6CF7D0-54BE-4AFB-B0FC-FA5E364208B7}" type="datetimeFigureOut">
               <a:rPr lang="en-US" smtClean="0"/>
               <a:pPr/>
-              <a:t>6/6/2009</a:t>
+              <a:t>8/5/2009</a:t>
             </a:fld>
             <a:endParaRPr lang="en-US"/>
           </a:p>
@@ -6978,7 +6978,7 @@
             <a:fld id="{AD6CF7D0-54BE-4AFB-B0FC-FA5E364208B7}" type="datetimeFigureOut">
               <a:rPr lang="en-US" smtClean="0"/>
               <a:pPr/>
-              <a:t>6/6/2009</a:t>
+              <a:t>8/5/2009</a:t>
             </a:fld>
             <a:endParaRPr lang="en-US"/>
           </a:p>
@@ -7228,7 +7228,7 @@
             <a:fld id="{AD6CF7D0-54BE-4AFB-B0FC-FA5E364208B7}" type="datetimeFigureOut">
               <a:rPr lang="en-US" smtClean="0"/>
               <a:pPr/>
-              <a:t>6/6/2009</a:t>
+              <a:t>8/5/2009</a:t>
             </a:fld>
             <a:endParaRPr lang="en-US"/>
           </a:p>
@@ -7438,7 +7438,7 @@
             <a:fld id="{AD6CF7D0-54BE-4AFB-B0FC-FA5E364208B7}" type="datetimeFigureOut">
               <a:rPr lang="en-US" smtClean="0"/>
               <a:pPr/>
-              <a:t>6/6/2009</a:t>
+              <a:t>8/5/2009</a:t>
             </a:fld>
             <a:endParaRPr lang="en-US"/>
           </a:p>
@@ -18475,7 +18475,7 @@
         </p:nvGraphicFramePr>
         <p:xfrm>
           <a:off x="762000" y="1295400"/>
-          <a:ext cx="8077200" cy="5461000"/>
+          <a:ext cx="8077200" cy="5090160"/>
         </p:xfrm>
         <a:graphic>
           <a:graphicData uri="http://schemas.openxmlformats.org/drawingml/2006/table">
@@ -18735,62 +18735,7 @@
                     <a:bodyPr/>
                     <a:lstStyle/>
                     <a:p>
-                      <a:endParaRPr lang="en-US"/>
-                    </a:p>
-                  </a:txBody>
-                  <a:tcPr/>
-                </a:tc>
-                <a:tc>
-                  <a:txBody>
-                    <a:bodyPr/>
-                    <a:lstStyle/>
-                    <a:p>
-                      <a:r>
-                        <a:rPr lang="en-US" dirty="0" err="1" smtClean="0"/>
-                        <a:t>cmdport</a:t>
-                      </a:r>
                       <a:endParaRPr lang="en-US" dirty="0"/>
-                    </a:p>
-                  </a:txBody>
-                  <a:tcPr/>
-                </a:tc>
-                <a:tc>
-                  <a:txBody>
-                    <a:bodyPr/>
-                    <a:lstStyle/>
-                    <a:p>
-                      <a:r>
-                        <a:rPr lang="en-US" dirty="0" smtClean="0"/>
-                        <a:t>8082</a:t>
-                      </a:r>
-                      <a:endParaRPr lang="en-US" dirty="0"/>
-                    </a:p>
-                  </a:txBody>
-                  <a:tcPr/>
-                </a:tc>
-                <a:tc>
-                  <a:txBody>
-                    <a:bodyPr/>
-                    <a:lstStyle/>
-                    <a:p>
-                      <a:pPr algn="l"/>
-                      <a:r>
-                        <a:rPr lang="en-US" dirty="0" smtClean="0"/>
-                        <a:t>Console port</a:t>
-                      </a:r>
-                      <a:endParaRPr lang="en-US" dirty="0"/>
-                    </a:p>
-                  </a:txBody>
-                  <a:tcPr/>
-                </a:tc>
-              </a:tr>
-              <a:tr h="370840">
-                <a:tc>
-                  <a:txBody>
-                    <a:bodyPr/>
-                    <a:lstStyle/>
-                    <a:p>
-                      <a:endParaRPr lang="en-US"/>
                     </a:p>
                   </a:txBody>
                   <a:tcPr/>
@@ -19364,7 +19309,7 @@
         </p:nvGraphicFramePr>
         <p:xfrm>
           <a:off x="762000" y="1295400"/>
-          <a:ext cx="8077200" cy="3403600"/>
+          <a:ext cx="8077200" cy="4145280"/>
         </p:xfrm>
         <a:graphic>
           <a:graphicData uri="http://schemas.openxmlformats.org/drawingml/2006/table">
@@ -19783,6 +19728,126 @@
                       <a:r>
                         <a:rPr lang="en-US" dirty="0" smtClean="0"/>
                         <a:t>-seconds)</a:t>
+                      </a:r>
+                      <a:endParaRPr lang="en-US" dirty="0"/>
+                    </a:p>
+                  </a:txBody>
+                  <a:tcPr/>
+                </a:tc>
+              </a:tr>
+              <a:tr h="370840">
+                <a:tc>
+                  <a:txBody>
+                    <a:bodyPr/>
+                    <a:lstStyle/>
+                    <a:p>
+                      <a:r>
+                        <a:rPr lang="en-US" dirty="0" smtClean="0"/>
+                        <a:t>Shell</a:t>
+                      </a:r>
+                      <a:endParaRPr lang="en-US" dirty="0"/>
+                    </a:p>
+                  </a:txBody>
+                  <a:tcPr/>
+                </a:tc>
+                <a:tc>
+                  <a:txBody>
+                    <a:bodyPr/>
+                    <a:lstStyle/>
+                    <a:p>
+                      <a:r>
+                        <a:rPr lang="en-US" dirty="0" smtClean="0"/>
+                        <a:t>load</a:t>
+                      </a:r>
+                      <a:endParaRPr lang="en-US" dirty="0"/>
+                    </a:p>
+                  </a:txBody>
+                  <a:tcPr/>
+                </a:tc>
+                <a:tc>
+                  <a:txBody>
+                    <a:bodyPr/>
+                    <a:lstStyle/>
+                    <a:p>
+                      <a:r>
+                        <a:rPr lang="en-US" dirty="0" smtClean="0"/>
+                        <a:t>0</a:t>
+                      </a:r>
+                      <a:endParaRPr lang="en-US" dirty="0"/>
+                    </a:p>
+                  </a:txBody>
+                  <a:tcPr/>
+                </a:tc>
+                <a:tc>
+                  <a:txBody>
+                    <a:bodyPr/>
+                    <a:lstStyle/>
+                    <a:p>
+                      <a:r>
+                        <a:rPr lang="en-US" dirty="0" smtClean="0"/>
+                        <a:t>Start Telnet</a:t>
+                      </a:r>
+                      <a:r>
+                        <a:rPr lang="en-US" baseline="0" dirty="0" smtClean="0"/>
+                        <a:t> server</a:t>
+                      </a:r>
+                      <a:endParaRPr lang="en-US" dirty="0"/>
+                    </a:p>
+                  </a:txBody>
+                  <a:tcPr/>
+                </a:tc>
+              </a:tr>
+              <a:tr h="370840">
+                <a:tc>
+                  <a:txBody>
+                    <a:bodyPr/>
+                    <a:lstStyle/>
+                    <a:p>
+                      <a:endParaRPr lang="en-US" dirty="0"/>
+                    </a:p>
+                  </a:txBody>
+                  <a:tcPr/>
+                </a:tc>
+                <a:tc>
+                  <a:txBody>
+                    <a:bodyPr/>
+                    <a:lstStyle/>
+                    <a:p>
+                      <a:r>
+                        <a:rPr lang="en-US" dirty="0" smtClean="0"/>
+                        <a:t>port</a:t>
+                      </a:r>
+                      <a:endParaRPr lang="en-US" dirty="0"/>
+                    </a:p>
+                  </a:txBody>
+                  <a:tcPr/>
+                </a:tc>
+                <a:tc>
+                  <a:txBody>
+                    <a:bodyPr/>
+                    <a:lstStyle/>
+                    <a:p>
+                      <a:r>
+                        <a:rPr lang="en-US" dirty="0" smtClean="0"/>
+                        <a:t>8082</a:t>
+                      </a:r>
+                      <a:endParaRPr lang="en-US" dirty="0"/>
+                    </a:p>
+                  </a:txBody>
+                  <a:tcPr/>
+                </a:tc>
+                <a:tc>
+                  <a:txBody>
+                    <a:bodyPr/>
+                    <a:lstStyle/>
+                    <a:p>
+                      <a:r>
+                        <a:rPr lang="en-US" dirty="0" smtClean="0"/>
+                        <a:t>Port at which Telnet server</a:t>
+                      </a:r>
+                      <a:r>
+                        <a:rPr lang="en-US" baseline="0" dirty="0" smtClean="0"/>
+                        <a:t> listens</a:t>
                       </a:r>
                       <a:endParaRPr lang="en-US" dirty="0"/>
                     </a:p>
@@ -20887,12 +20952,8 @@
               <a:t>Set command port with </a:t>
             </a:r>
             <a:r>
-              <a:rPr lang="en-US" dirty="0" err="1" smtClean="0"/>
-              <a:t>cmdport</a:t>
-            </a:r>
-            <a:r>
-              <a:rPr lang="en-US" dirty="0" smtClean="0"/>
-              <a:t> </a:t>
+              <a:rPr lang="en-US" dirty="0" smtClean="0"/>
+              <a:t>port and load </a:t>
             </a:r>
             <a:r>
               <a:rPr lang="en-US" dirty="0" err="1" smtClean="0"/>
@@ -20900,15 +20961,23 @@
             </a:r>
             <a:r>
               <a:rPr lang="en-US" dirty="0" smtClean="0"/>
-              <a:t> parameter in </a:t>
-            </a:r>
-            <a:r>
-              <a:rPr lang="en-US" dirty="0" err="1" smtClean="0"/>
-              <a:t>wub</a:t>
-            </a:r>
-            <a:r>
-              <a:rPr lang="en-US" dirty="0" smtClean="0"/>
-              <a:t> section</a:t>
+              <a:t> </a:t>
+            </a:r>
+            <a:r>
+              <a:rPr lang="en-US" dirty="0" smtClean="0"/>
+              <a:t>parameters </a:t>
+            </a:r>
+            <a:r>
+              <a:rPr lang="en-US" dirty="0" smtClean="0"/>
+              <a:t>in </a:t>
+            </a:r>
+            <a:r>
+              <a:rPr lang="en-US" dirty="0" smtClean="0"/>
+              <a:t>Shell </a:t>
+            </a:r>
+            <a:r>
+              <a:rPr lang="en-US" dirty="0" smtClean="0"/>
+              <a:t>section</a:t>
             </a:r>
             <a:endParaRPr lang="en-US" dirty="0"/>
           </a:p>

</xml_diff>